<commit_message>
Update VuFind Leipzig Annette final.pptx
</commit_message>
<xml_diff>
--- a/VuFind Leipzig Annette final.pptx
+++ b/VuFind Leipzig Annette final.pptx
@@ -8043,14 +8043,6 @@
               </a:rPr>
               <a:t>https://github.com/StabiBerlin/sbb-relevance-test</a:t>
             </a:r>
-          </a:p>
-          <a:p>
-            <a:pPr marL="0" indent="0">
-              <a:buNone/>
-            </a:pPr>
-            <a:endParaRPr lang="de-DE" sz="2000">
-              <a:hlinkClick r:id="rId7"/>
-            </a:endParaRPr>
           </a:p>
           <a:p>
             <a:pPr marL="0" indent="0">

</xml_diff>